<commit_message>
completed challenge with presentation
</commit_message>
<xml_diff>
--- a/Jasper_DIIG_PPT.pptx
+++ b/Jasper_DIIG_PPT.pptx
@@ -1785,7 +1785,7 @@
           <a:p>
             <a:fld id="{8F72BA41-EC5B-4197-BCC8-0FD2E523CD7A}" type="datetimeFigureOut">
               <a:rPr lang="en-US" smtClean="0"/>
-              <a:t>1/25/23</a:t>
+              <a:t>9/19/23</a:t>
             </a:fld>
             <a:endParaRPr lang="en-US"/>
           </a:p>
@@ -1988,7 +1988,7 @@
           <a:p>
             <a:fld id="{8F72BA41-EC5B-4197-BCC8-0FD2E523CD7A}" type="datetimeFigureOut">
               <a:rPr lang="en-US" smtClean="0"/>
-              <a:t>1/25/23</a:t>
+              <a:t>9/19/23</a:t>
             </a:fld>
             <a:endParaRPr lang="en-US"/>
           </a:p>
@@ -3709,7 +3709,7 @@
           <a:p>
             <a:fld id="{8F72BA41-EC5B-4197-BCC8-0FD2E523CD7A}" type="datetimeFigureOut">
               <a:rPr lang="en-US" smtClean="0"/>
-              <a:t>1/25/23</a:t>
+              <a:t>9/19/23</a:t>
             </a:fld>
             <a:endParaRPr lang="en-US"/>
           </a:p>
@@ -3908,7 +3908,7 @@
           <a:p>
             <a:fld id="{8F72BA41-EC5B-4197-BCC8-0FD2E523CD7A}" type="datetimeFigureOut">
               <a:rPr lang="en-US" smtClean="0"/>
-              <a:t>1/25/23</a:t>
+              <a:t>9/19/23</a:t>
             </a:fld>
             <a:endParaRPr lang="en-US"/>
           </a:p>
@@ -5698,7 +5698,7 @@
           <a:p>
             <a:fld id="{8F72BA41-EC5B-4197-BCC8-0FD2E523CD7A}" type="datetimeFigureOut">
               <a:rPr lang="en-US" smtClean="0"/>
-              <a:t>1/25/23</a:t>
+              <a:t>9/19/23</a:t>
             </a:fld>
             <a:endParaRPr lang="en-US"/>
           </a:p>
@@ -5971,7 +5971,7 @@
           <a:p>
             <a:fld id="{8F72BA41-EC5B-4197-BCC8-0FD2E523CD7A}" type="datetimeFigureOut">
               <a:rPr lang="en-US" smtClean="0"/>
-              <a:t>1/25/23</a:t>
+              <a:t>9/19/23</a:t>
             </a:fld>
             <a:endParaRPr lang="en-US"/>
           </a:p>
@@ -6391,7 +6391,7 @@
           <a:p>
             <a:fld id="{8F72BA41-EC5B-4197-BCC8-0FD2E523CD7A}" type="datetimeFigureOut">
               <a:rPr lang="en-US" smtClean="0"/>
-              <a:t>1/25/23</a:t>
+              <a:t>9/19/23</a:t>
             </a:fld>
             <a:endParaRPr lang="en-US"/>
           </a:p>
@@ -6547,7 +6547,7 @@
           <a:p>
             <a:fld id="{8F72BA41-EC5B-4197-BCC8-0FD2E523CD7A}" type="datetimeFigureOut">
               <a:rPr lang="en-US" smtClean="0"/>
-              <a:t>1/25/23</a:t>
+              <a:t>9/19/23</a:t>
             </a:fld>
             <a:endParaRPr lang="en-US"/>
           </a:p>
@@ -8115,7 +8115,7 @@
           <a:p>
             <a:fld id="{8F72BA41-EC5B-4197-BCC8-0FD2E523CD7A}" type="datetimeFigureOut">
               <a:rPr lang="en-US" smtClean="0"/>
-              <a:t>1/25/23</a:t>
+              <a:t>9/19/23</a:t>
             </a:fld>
             <a:endParaRPr lang="en-US"/>
           </a:p>
@@ -9966,7 +9966,7 @@
           <a:p>
             <a:fld id="{8F72BA41-EC5B-4197-BCC8-0FD2E523CD7A}" type="datetimeFigureOut">
               <a:rPr lang="en-US" smtClean="0"/>
-              <a:t>1/25/23</a:t>
+              <a:t>9/19/23</a:t>
             </a:fld>
             <a:endParaRPr lang="en-US"/>
           </a:p>
@@ -11779,7 +11779,7 @@
           <a:p>
             <a:fld id="{8F72BA41-EC5B-4197-BCC8-0FD2E523CD7A}" type="datetimeFigureOut">
               <a:rPr lang="en-US" smtClean="0"/>
-              <a:t>1/25/23</a:t>
+              <a:t>9/19/23</a:t>
             </a:fld>
             <a:endParaRPr lang="en-US"/>
           </a:p>
@@ -13473,7 +13473,7 @@
             <a:fld id="{8F72BA41-EC5B-4197-BCC8-0FD2E523CD7A}" type="datetimeFigureOut">
               <a:rPr lang="en-US" smtClean="0"/>
               <a:pPr/>
-              <a:t>1/25/23</a:t>
+              <a:t>9/19/23</a:t>
             </a:fld>
             <a:endParaRPr lang="en-US" dirty="0"/>
           </a:p>
@@ -16104,7 +16104,7 @@
                   <a:srgbClr val="FFFFFF"/>
                 </a:solidFill>
               </a:rPr>
-              <a:t>Class of 2026</a:t>
+              <a:t>Class of 2025</a:t>
             </a:r>
           </a:p>
         </p:txBody>

</xml_diff>